<commit_message>
updates, proof reading slideshow
</commit_message>
<xml_diff>
--- a/cyclistic_bike_share_analysis.pptx
+++ b/cyclistic_bike_share_analysis.pptx
@@ -126,6 +126,14 @@
       </a:defRPr>
     </a:lvl9pPr>
   </p:defaultTextStyle>
+  <p:extLst>
+    <p:ext uri="{EFAFB233-063F-42B5-8137-9DF3F51BA10A}">
+      <p15:sldGuideLst xmlns:p15="http://schemas.microsoft.com/office/powerpoint/2012/main"/>
+    </p:ext>
+    <p:ext uri="{2D200454-40CA-4A62-9FC3-DE9A4176ACB9}">
+      <p15:notesGuideLst xmlns:p15="http://schemas.microsoft.com/office/powerpoint/2012/main"/>
+    </p:ext>
+  </p:extLst>
 </p:presentation>
 </file>
 
@@ -12009,7 +12017,7 @@
           <a:p>
             <a:fld id="{DBC7FBE2-6518-415A-A688-EC8966B7086F}" type="datetimeFigureOut">
               <a:rPr lang="en-CA" smtClean="0"/>
-              <a:t>08/08/2023</a:t>
+              <a:t>08/09/2023</a:t>
             </a:fld>
             <a:endParaRPr lang="en-CA"/>
           </a:p>
@@ -12322,93 +12330,40 @@
           <a:lstStyle/>
           <a:p>
             <a:r>
-              <a:rPr lang="en-US" dirty="0" err="1"/>
-              <a:t>Cyclistic</a:t>
+              <a:rPr lang="en-US" dirty="0"/>
+              <a:t>This slideshow is created as part of the </a:t>
             </a:r>
             <a:r>
-              <a:rPr lang="en-US" dirty="0"/>
-              <a:t> is a bike-share service operating a fleet of 5842 bicycles across 692 stations across Chicago.</a:t>
+              <a:rPr lang="en-US" b="0" dirty="0">
+                <a:solidFill>
+                  <a:srgbClr val="F8F8F2"/>
+                </a:solidFill>
+                <a:effectLst/>
+                <a:latin typeface="Consolas" panose="020B0609020204030204" pitchFamily="49" charset="0"/>
+              </a:rPr>
+              <a:t>Google Data Analytics Professional Certificate’s Capstone Project. </a:t>
             </a:r>
           </a:p>
           <a:p>
-            <a:endParaRPr lang="en-US" dirty="0"/>
+            <a:endParaRPr lang="en-US" b="0" dirty="0">
+              <a:solidFill>
+                <a:srgbClr val="F8F8F2"/>
+              </a:solidFill>
+              <a:effectLst/>
+              <a:latin typeface="Consolas" panose="020B0609020204030204" pitchFamily="49" charset="0"/>
+            </a:endParaRPr>
           </a:p>
           <a:p>
             <a:r>
-              <a:rPr lang="en-US" dirty="0" err="1"/>
-              <a:t>Cyclistic</a:t>
+              <a:rPr lang="en-US" b="0" dirty="0">
+                <a:solidFill>
+                  <a:srgbClr val="F8F8F2"/>
+                </a:solidFill>
+                <a:effectLst/>
+                <a:latin typeface="Consolas" panose="020B0609020204030204" pitchFamily="49" charset="0"/>
+              </a:rPr>
+              <a:t>The purpose of this project is to demonstrate all the skills learned during the program and put them to use performing data analysis in a way that can be showcased as part of a portfolio of our accomplishments.</a:t>
             </a:r>
-            <a:r>
-              <a:rPr lang="en-US" dirty="0"/>
-              <a:t> categorized their riders in one of two categories:</a:t>
-            </a:r>
-          </a:p>
-          <a:p>
-            <a:endParaRPr lang="en-US" dirty="0"/>
-          </a:p>
-          <a:p>
-            <a:pPr marL="171450" indent="-171450">
-              <a:buFont typeface="Arial" panose="020B0604020202020204" pitchFamily="34" charset="0"/>
-              <a:buChar char="•"/>
-            </a:pPr>
-            <a:r>
-              <a:rPr lang="en-US" dirty="0"/>
-              <a:t>Casual riders who use single-ride passes or full-day passes</a:t>
-            </a:r>
-          </a:p>
-          <a:p>
-            <a:pPr marL="171450" indent="-171450">
-              <a:buFont typeface="Arial" panose="020B0604020202020204" pitchFamily="34" charset="0"/>
-              <a:buChar char="•"/>
-            </a:pPr>
-            <a:r>
-              <a:rPr lang="en-US" dirty="0"/>
-              <a:t>Riders with annual memberships.</a:t>
-            </a:r>
-          </a:p>
-          <a:p>
-            <a:endParaRPr lang="en-US" dirty="0"/>
-          </a:p>
-          <a:p>
-            <a:r>
-              <a:rPr lang="en-US" dirty="0" err="1"/>
-              <a:t>Cyclistic's</a:t>
-            </a:r>
-            <a:r>
-              <a:rPr lang="en-US" dirty="0"/>
-              <a:t> financial analysts have concluded that annual members are more profitable than casual riders.</a:t>
-            </a:r>
-          </a:p>
-          <a:p>
-            <a:endParaRPr lang="en-US" dirty="0"/>
-          </a:p>
-          <a:p>
-            <a:r>
-              <a:rPr lang="en-US" dirty="0" err="1"/>
-              <a:t>Cyclistic's</a:t>
-            </a:r>
-            <a:r>
-              <a:rPr lang="en-US" dirty="0"/>
-              <a:t> marketing team want to create a marketing campaign designed to convert casual riders into annual members.</a:t>
-            </a:r>
-          </a:p>
-          <a:p>
-            <a:endParaRPr lang="en-US" dirty="0"/>
-          </a:p>
-          <a:p>
-            <a:r>
-              <a:rPr lang="en-US" dirty="0"/>
-              <a:t>Before the marketing campaign can be started trends need to be identified in </a:t>
-            </a:r>
-            <a:r>
-              <a:rPr lang="en-US" dirty="0" err="1"/>
-              <a:t>Cyclistic's</a:t>
-            </a:r>
-            <a:r>
-              <a:rPr lang="en-US" dirty="0"/>
-              <a:t> historical bike trip data.</a:t>
-            </a:r>
-            <a:endParaRPr lang="en-CA" dirty="0"/>
           </a:p>
         </p:txBody>
       </p:sp>
@@ -12429,7 +12384,7 @@
           <a:p>
             <a:fld id="{28CF0B81-02AC-4A04-B1DC-20AE0A764FEF}" type="slidenum">
               <a:rPr lang="en-CA" smtClean="0"/>
-              <a:t>2</a:t>
+              <a:t>1</a:t>
             </a:fld>
             <a:endParaRPr lang="en-CA"/>
           </a:p>
@@ -12438,7 +12393,7 @@
     </p:spTree>
     <p:extLst>
       <p:ext uri="{BB962C8B-B14F-4D97-AF65-F5344CB8AC3E}">
-        <p14:creationId xmlns:p14="http://schemas.microsoft.com/office/powerpoint/2010/main" val="2629872750"/>
+        <p14:creationId xmlns:p14="http://schemas.microsoft.com/office/powerpoint/2010/main" val="2094381200"/>
       </p:ext>
     </p:extLst>
   </p:cSld>
@@ -12494,7 +12449,7 @@
           <a:p>
             <a:r>
               <a:rPr lang="en-US" dirty="0"/>
-              <a:t>Casual riders seem to prefer electric bikes over classic peddle bikes while annual members do not seem to have a preference one way or the other.</a:t>
+              <a:t>Rides from annual members tend to be shorter than casual riders. </a:t>
             </a:r>
           </a:p>
           <a:p>
@@ -12503,7 +12458,7 @@
           <a:p>
             <a:r>
               <a:rPr lang="en-US" dirty="0"/>
-              <a:t>Casual riders are also the only group that rides docked bikes.</a:t>
+              <a:t>The ride duration for annual members is heavily grouped around the 5-minute mark, and while casual riders do also tend to like short rides, the concentration is not as extreme.</a:t>
             </a:r>
           </a:p>
         </p:txBody>
@@ -12525,7 +12480,7 @@
           <a:p>
             <a:fld id="{28CF0B81-02AC-4A04-B1DC-20AE0A764FEF}" type="slidenum">
               <a:rPr lang="en-CA" smtClean="0"/>
-              <a:t>11</a:t>
+              <a:t>10</a:t>
             </a:fld>
             <a:endParaRPr lang="en-CA"/>
           </a:p>
@@ -12534,7 +12489,7 @@
     </p:spTree>
     <p:extLst>
       <p:ext uri="{BB962C8B-B14F-4D97-AF65-F5344CB8AC3E}">
-        <p14:creationId xmlns:p14="http://schemas.microsoft.com/office/powerpoint/2010/main" val="3490159341"/>
+        <p14:creationId xmlns:p14="http://schemas.microsoft.com/office/powerpoint/2010/main" val="4278072958"/>
       </p:ext>
     </p:extLst>
   </p:cSld>
@@ -12590,7 +12545,7 @@
           <a:p>
             <a:r>
               <a:rPr lang="en-US" dirty="0"/>
-              <a:t>By taking the starting latitude and longitude of a ride, and cross referencing it with geospatial data of the different neighborhoods of Chicago we were able to determine which areas of the city rides took place in.</a:t>
+              <a:t>Casual riders seem to prefer electric bikes over classic peddle bikes while annual members do not seem to have a preference one way or the other.</a:t>
             </a:r>
           </a:p>
           <a:p>
@@ -12599,7 +12554,7 @@
           <a:p>
             <a:r>
               <a:rPr lang="en-US" dirty="0"/>
-              <a:t>The graph above shows the top ten neighborhoods that contained the most rides (both casual riders and annual members). These areas are color coded with yellow being the largest quantity and violet being the smallest quantity and various colors of green and blue being in the middle. The neighborhoods outlined in grey are ones outside the top ten.</a:t>
+              <a:t>Casual riders are also the only group that rides docked bikes.</a:t>
             </a:r>
           </a:p>
         </p:txBody>
@@ -12621,7 +12576,7 @@
           <a:p>
             <a:fld id="{28CF0B81-02AC-4A04-B1DC-20AE0A764FEF}" type="slidenum">
               <a:rPr lang="en-CA" smtClean="0"/>
-              <a:t>12</a:t>
+              <a:t>11</a:t>
             </a:fld>
             <a:endParaRPr lang="en-CA"/>
           </a:p>
@@ -12630,7 +12585,7 @@
     </p:spTree>
     <p:extLst>
       <p:ext uri="{BB962C8B-B14F-4D97-AF65-F5344CB8AC3E}">
-        <p14:creationId xmlns:p14="http://schemas.microsoft.com/office/powerpoint/2010/main" val="3714916878"/>
+        <p14:creationId xmlns:p14="http://schemas.microsoft.com/office/powerpoint/2010/main" val="3490159341"/>
       </p:ext>
     </p:extLst>
   </p:cSld>
@@ -12686,7 +12641,7 @@
           <a:p>
             <a:r>
               <a:rPr lang="en-US" dirty="0"/>
-              <a:t>The next step is to take that same map and separate the annual members from the casual riders. Above is the top 10 neighborhoods for annual members.</a:t>
+              <a:t>By taking the starting latitude and longitude of a ride, and cross referencing it with geospatial data of the different neighborhoods of Chicago we were able to determine which areas of the city rides took place in.</a:t>
             </a:r>
           </a:p>
           <a:p>
@@ -12695,18 +12650,8 @@
           <a:p>
             <a:r>
               <a:rPr lang="en-US" dirty="0"/>
-              <a:t>At first glance this map and the total rider map do not seem that different; all the same neighborhoods are listed, just with a different number of rides. But looking at the table we can start to see a difference between the two groups. </a:t>
+              <a:t>The graph above shows the top ten neighborhoods that contained the most rides (both casual riders and annual members). These areas are color coded with yellow being the largest quantity and violet being the smallest quantity and various colors of green and blue being in the middle. The neighborhoods outlined in grey are ones outside the top ten.</a:t>
             </a:r>
-          </a:p>
-          <a:p>
-            <a:endParaRPr lang="en-US" dirty="0"/>
-          </a:p>
-          <a:p>
-            <a:r>
-              <a:rPr lang="en-US" dirty="0"/>
-              <a:t>The table is sorted by Member Rides in descending order, and we see that the casual rides don’t follow a similar trend; their numbers are all over the place. It looks like the casual riders choose to ride in some areas more than those with annual memberships do.</a:t>
-            </a:r>
-            <a:endParaRPr lang="en-CA" dirty="0"/>
           </a:p>
         </p:txBody>
       </p:sp>
@@ -12727,7 +12672,7 @@
           <a:p>
             <a:fld id="{28CF0B81-02AC-4A04-B1DC-20AE0A764FEF}" type="slidenum">
               <a:rPr lang="en-CA" smtClean="0"/>
-              <a:t>13</a:t>
+              <a:t>12</a:t>
             </a:fld>
             <a:endParaRPr lang="en-CA"/>
           </a:p>
@@ -12736,7 +12681,7 @@
     </p:spTree>
     <p:extLst>
       <p:ext uri="{BB962C8B-B14F-4D97-AF65-F5344CB8AC3E}">
-        <p14:creationId xmlns:p14="http://schemas.microsoft.com/office/powerpoint/2010/main" val="3884338527"/>
+        <p14:creationId xmlns:p14="http://schemas.microsoft.com/office/powerpoint/2010/main" val="3714916878"/>
       </p:ext>
     </p:extLst>
   </p:cSld>
@@ -12792,7 +12737,7 @@
           <a:p>
             <a:r>
               <a:rPr lang="en-US" dirty="0"/>
-              <a:t>Continuing this, if we look at where casual riders tend to go, we see another change; there are neighborhoods (Old Town and Logan Square) that make the top ten for casual riders but not for annual riders. There are still more annual members in those neighborhoods, but casual riders give those neighborhoods more attention.</a:t>
+              <a:t>The next step is to take that same map and separate the annual members from the casual riders. Above is the top 10 neighborhoods for annual members.</a:t>
             </a:r>
           </a:p>
           <a:p>
@@ -12801,16 +12746,18 @@
           <a:p>
             <a:r>
               <a:rPr lang="en-US" dirty="0"/>
-              <a:t>Looking again at the table we can see that </a:t>
+              <a:t>At first glance this map and the total rider map do not seem that different; all the same neighborhoods are listed, just with a different number of rides. But looking at the table we can start to see a difference between the two groups. </a:t>
             </a:r>
-            <a:r>
-              <a:rPr lang="en-US" dirty="0" err="1"/>
-              <a:t>Streeterville</a:t>
-            </a:r>
+          </a:p>
+          <a:p>
+            <a:endParaRPr lang="en-US" dirty="0"/>
+          </a:p>
+          <a:p>
             <a:r>
               <a:rPr lang="en-US" dirty="0"/>
-              <a:t> is a neighborhood that gets more Casual Rides than Member Rides. This is unique because it is the first neighborhood we have seen where there are more casual rides than member rides. As a result, we will proceed with mapping the difference between Casual Rides and Member Rides.</a:t>
+              <a:t>The table is sorted by Member Rides in descending order, and we see that the casual rides don’t follow a similar trend; their numbers are all over the place. It looks like the casual riders choose to ride in some areas more than those with annual memberships do.</a:t>
             </a:r>
+            <a:endParaRPr lang="en-CA" dirty="0"/>
           </a:p>
         </p:txBody>
       </p:sp>
@@ -12831,7 +12778,7 @@
           <a:p>
             <a:fld id="{28CF0B81-02AC-4A04-B1DC-20AE0A764FEF}" type="slidenum">
               <a:rPr lang="en-CA" smtClean="0"/>
-              <a:t>14</a:t>
+              <a:t>13</a:t>
             </a:fld>
             <a:endParaRPr lang="en-CA"/>
           </a:p>
@@ -12840,7 +12787,7 @@
     </p:spTree>
     <p:extLst>
       <p:ext uri="{BB962C8B-B14F-4D97-AF65-F5344CB8AC3E}">
-        <p14:creationId xmlns:p14="http://schemas.microsoft.com/office/powerpoint/2010/main" val="4289518380"/>
+        <p14:creationId xmlns:p14="http://schemas.microsoft.com/office/powerpoint/2010/main" val="3884338527"/>
       </p:ext>
     </p:extLst>
   </p:cSld>
@@ -12896,7 +12843,7 @@
           <a:p>
             <a:r>
               <a:rPr lang="en-US" dirty="0"/>
-              <a:t>Starting with the Annual Members again, this map shows the top five neighborhoods where the number of member rides out numbered the number of casual rides. </a:t>
+              <a:t>Continuing this, if we look at where casual riders tend to go, we see another change; there are neighborhoods (Old Town and Logan Square) that make the top ten for casual riders but not for annual riders. There are still more annual members in those neighborhoods, but casual riders give those neighborhoods more attention.</a:t>
             </a:r>
           </a:p>
           <a:p>
@@ -12905,18 +12852,16 @@
           <a:p>
             <a:r>
               <a:rPr lang="en-US" dirty="0"/>
-              <a:t>There isn’t too much surprising here, it’s a lot of the same neighborhoods that we have been seeing before.</a:t>
+              <a:t>Looking again at the table we can see that </a:t>
             </a:r>
-          </a:p>
-          <a:p>
-            <a:endParaRPr lang="en-CA" dirty="0"/>
-          </a:p>
-          <a:p>
             <a:r>
-              <a:rPr lang="en-CA" dirty="0"/>
-              <a:t>However, the one trend that we can identify here is that the neighborhoods with more member rides than casual rides tend to be urban.</a:t>
+              <a:rPr lang="en-US" dirty="0" err="1"/>
+              <a:t>Streeterville</a:t>
             </a:r>
-            <a:endParaRPr lang="en-US" dirty="0"/>
+            <a:r>
+              <a:rPr lang="en-US" dirty="0"/>
+              <a:t> is a neighborhood that gets more Casual Rides than Member Rides. This is unique because it is the first neighborhood we have seen where there are more casual rides than member rides. As a result, we will proceed with mapping the difference between Casual Rides and Member Rides.</a:t>
+            </a:r>
           </a:p>
         </p:txBody>
       </p:sp>
@@ -12937,7 +12882,7 @@
           <a:p>
             <a:fld id="{28CF0B81-02AC-4A04-B1DC-20AE0A764FEF}" type="slidenum">
               <a:rPr lang="en-CA" smtClean="0"/>
-              <a:t>15</a:t>
+              <a:t>14</a:t>
             </a:fld>
             <a:endParaRPr lang="en-CA"/>
           </a:p>
@@ -12946,7 +12891,7 @@
     </p:spTree>
     <p:extLst>
       <p:ext uri="{BB962C8B-B14F-4D97-AF65-F5344CB8AC3E}">
-        <p14:creationId xmlns:p14="http://schemas.microsoft.com/office/powerpoint/2010/main" val="2221545766"/>
+        <p14:creationId xmlns:p14="http://schemas.microsoft.com/office/powerpoint/2010/main" val="4289518380"/>
       </p:ext>
     </p:extLst>
   </p:cSld>
@@ -13002,9 +12947,27 @@
           <a:p>
             <a:r>
               <a:rPr lang="en-US" dirty="0"/>
-              <a:t>And when we look at neighborhoods with more casual rides than member rides, we see casual riders preferring to ride in neighborhoods with more parks and green space.</a:t>
+              <a:t>Starting with the Annual Members again, this map shows the top five neighborhoods where the number of member rides out numbered the number of casual rides. </a:t>
             </a:r>
+          </a:p>
+          <a:p>
+            <a:endParaRPr lang="en-US" dirty="0"/>
+          </a:p>
+          <a:p>
+            <a:r>
+              <a:rPr lang="en-US" dirty="0"/>
+              <a:t>There isn’t too much surprising here, it’s a lot of the same neighborhoods that we have been seeing before.</a:t>
+            </a:r>
+          </a:p>
+          <a:p>
             <a:endParaRPr lang="en-CA" dirty="0"/>
+          </a:p>
+          <a:p>
+            <a:r>
+              <a:rPr lang="en-CA" dirty="0"/>
+              <a:t>However, the one trend that we can identify here is that the neighborhoods with more member rides than casual rides tend to be urban.</a:t>
+            </a:r>
+            <a:endParaRPr lang="en-US" dirty="0"/>
           </a:p>
         </p:txBody>
       </p:sp>
@@ -13025,7 +12988,7 @@
           <a:p>
             <a:fld id="{28CF0B81-02AC-4A04-B1DC-20AE0A764FEF}" type="slidenum">
               <a:rPr lang="en-CA" smtClean="0"/>
-              <a:t>16</a:t>
+              <a:t>15</a:t>
             </a:fld>
             <a:endParaRPr lang="en-CA"/>
           </a:p>
@@ -13034,7 +12997,7 @@
     </p:spTree>
     <p:extLst>
       <p:ext uri="{BB962C8B-B14F-4D97-AF65-F5344CB8AC3E}">
-        <p14:creationId xmlns:p14="http://schemas.microsoft.com/office/powerpoint/2010/main" val="1253288993"/>
+        <p14:creationId xmlns:p14="http://schemas.microsoft.com/office/powerpoint/2010/main" val="2221545766"/>
       </p:ext>
     </p:extLst>
   </p:cSld>
@@ -13090,26 +13053,9 @@
           <a:p>
             <a:r>
               <a:rPr lang="en-US" dirty="0"/>
-              <a:t>To summarize the results of our analysis:</a:t>
+              <a:t>And when we look at neighborhoods with more casual rides than member rides, we see casual riders preferring to ride in neighborhoods with more parks and green space.</a:t>
             </a:r>
-          </a:p>
-          <a:p>
-            <a:endParaRPr lang="en-US" dirty="0"/>
-          </a:p>
-          <a:p>
-            <a:r>
-              <a:rPr lang="en-US" dirty="0"/>
-              <a:t>Annual Members seem more likely to ride during the week, more inclined to ride during the winter, will often take shorter rides, ride more in the morning and ride in urban areas.</a:t>
-            </a:r>
-          </a:p>
-          <a:p>
-            <a:endParaRPr lang="en-US" dirty="0"/>
-          </a:p>
-          <a:p>
-            <a:r>
-              <a:rPr lang="en-US" dirty="0"/>
-              <a:t>Meanwhile casual riders are more likely to ride during the weekend, take longer rides, ride in recreational areas and prefer to ride electric bikes.</a:t>
-            </a:r>
+            <a:endParaRPr lang="en-CA" dirty="0"/>
           </a:p>
         </p:txBody>
       </p:sp>
@@ -13130,7 +13076,7 @@
           <a:p>
             <a:fld id="{28CF0B81-02AC-4A04-B1DC-20AE0A764FEF}" type="slidenum">
               <a:rPr lang="en-CA" smtClean="0"/>
-              <a:t>17</a:t>
+              <a:t>16</a:t>
             </a:fld>
             <a:endParaRPr lang="en-CA"/>
           </a:p>
@@ -13139,7 +13085,7 @@
     </p:spTree>
     <p:extLst>
       <p:ext uri="{BB962C8B-B14F-4D97-AF65-F5344CB8AC3E}">
-        <p14:creationId xmlns:p14="http://schemas.microsoft.com/office/powerpoint/2010/main" val="3539292181"/>
+        <p14:creationId xmlns:p14="http://schemas.microsoft.com/office/powerpoint/2010/main" val="1253288993"/>
       </p:ext>
     </p:extLst>
   </p:cSld>
@@ -13195,15 +13141,16 @@
           <a:p>
             <a:r>
               <a:rPr lang="en-US" dirty="0"/>
-              <a:t>From this we can draw a conclusion that most annual members tend to use </a:t>
+              <a:t>To summarize the results of our analysis:</a:t>
             </a:r>
-            <a:r>
-              <a:rPr lang="en-US" dirty="0" err="1"/>
-              <a:t>Cyclistic</a:t>
-            </a:r>
+          </a:p>
+          <a:p>
+            <a:endParaRPr lang="en-US" dirty="0"/>
+          </a:p>
+          <a:p>
             <a:r>
               <a:rPr lang="en-US" dirty="0"/>
-              <a:t> as part of their daily commute while casual riders use it for leisure.</a:t>
+              <a:t>Annual Members seem more likely to ride during the week, more inclined to ride during the winter, will often take shorter rides, ride more in the morning and ride in urban areas.</a:t>
             </a:r>
           </a:p>
           <a:p>
@@ -13212,34 +13159,8 @@
           <a:p>
             <a:r>
               <a:rPr lang="en-US" dirty="0"/>
-              <a:t>Annual Members are riding in the morning, during the week and even if the weather is colder; they still need to get to work and they are choosing </a:t>
+              <a:t>Meanwhile casual riders are more likely to ride during the weekend, take longer rides, ride in recreational areas and prefer to ride electric bikes.</a:t>
             </a:r>
-            <a:r>
-              <a:rPr lang="en-US" dirty="0" err="1"/>
-              <a:t>Cyclistic</a:t>
-            </a:r>
-            <a:r>
-              <a:rPr lang="en-US" dirty="0"/>
-              <a:t> to do it.</a:t>
-            </a:r>
-          </a:p>
-          <a:p>
-            <a:endParaRPr lang="en-US" dirty="0"/>
-          </a:p>
-          <a:p>
-            <a:r>
-              <a:rPr lang="en-US" dirty="0"/>
-              <a:t>Casual Riders ride during the weekend, later in the day during the warmer summer months and they are riding in areas where it’s fun to ride, like parks or other green spaces.</a:t>
-            </a:r>
-          </a:p>
-          <a:p>
-            <a:endParaRPr lang="en-US" dirty="0"/>
-          </a:p>
-          <a:p>
-            <a:endParaRPr lang="en-US" dirty="0"/>
-          </a:p>
-          <a:p>
-            <a:endParaRPr lang="en-CA" dirty="0"/>
           </a:p>
         </p:txBody>
       </p:sp>
@@ -13260,7 +13181,7 @@
           <a:p>
             <a:fld id="{28CF0B81-02AC-4A04-B1DC-20AE0A764FEF}" type="slidenum">
               <a:rPr lang="en-CA" smtClean="0"/>
-              <a:t>18</a:t>
+              <a:t>17</a:t>
             </a:fld>
             <a:endParaRPr lang="en-CA"/>
           </a:p>
@@ -13269,7 +13190,7 @@
     </p:spTree>
     <p:extLst>
       <p:ext uri="{BB962C8B-B14F-4D97-AF65-F5344CB8AC3E}">
-        <p14:creationId xmlns:p14="http://schemas.microsoft.com/office/powerpoint/2010/main" val="4199497915"/>
+        <p14:creationId xmlns:p14="http://schemas.microsoft.com/office/powerpoint/2010/main" val="3539292181"/>
       </p:ext>
     </p:extLst>
   </p:cSld>
@@ -13325,41 +13246,51 @@
           <a:p>
             <a:r>
               <a:rPr lang="en-US" dirty="0"/>
-              <a:t>From the trends in annual members and casual riders, we would suggest that the marketing department take the following actions:</a:t>
+              <a:t>From this we can draw a conclusion that most annual members tend to use </a:t>
             </a:r>
-          </a:p>
-          <a:p>
-            <a:endParaRPr lang="en-US" dirty="0"/>
-          </a:p>
-          <a:p>
-            <a:pPr marL="228600" indent="-228600">
-              <a:buFont typeface="+mj-lt"/>
-              <a:buAutoNum type="arabicPeriod"/>
-            </a:pPr>
+            <a:r>
+              <a:rPr lang="en-US" dirty="0" err="1"/>
+              <a:t>Cyclistic</a:t>
+            </a:r>
             <a:r>
               <a:rPr lang="en-US" dirty="0"/>
-              <a:t>Target users who ride for recreation. Those who go out to parks or are looking for a fun way to get around town during the weekends.</a:t>
+              <a:t> as part of their daily commute while casual riders use it for leisure.</a:t>
             </a:r>
           </a:p>
           <a:p>
-            <a:pPr marL="228600" indent="-228600">
-              <a:buFont typeface="+mj-lt"/>
-              <a:buAutoNum type="arabicPeriod"/>
-            </a:pPr>
+            <a:endParaRPr lang="en-US" dirty="0"/>
+          </a:p>
+          <a:p>
             <a:r>
               <a:rPr lang="en-US" dirty="0"/>
-              <a:t>Focus ads to run during the summer when casual riders are more likely to use the service as opposed to winter.</a:t>
+              <a:t>Annual Members are riding in the morning, during the week and even if the weather is colder; they still need to get to work and they are choosing </a:t>
             </a:r>
-          </a:p>
-          <a:p>
-            <a:pPr marL="228600" indent="-228600">
-              <a:buFont typeface="+mj-lt"/>
-              <a:buAutoNum type="arabicPeriod"/>
-            </a:pPr>
+            <a:r>
+              <a:rPr lang="en-US" dirty="0" err="1"/>
+              <a:t>Cyclistic</a:t>
+            </a:r>
             <a:r>
               <a:rPr lang="en-US" dirty="0"/>
-              <a:t>Incorporate electric bikes in the advertising. Either by showing off the electric bikes or possibly offer a promotion or some incentive to make accessing an electric bike easier with an annual membership to encourage more casual riders to switch.</a:t>
+              <a:t> to do it.</a:t>
             </a:r>
+          </a:p>
+          <a:p>
+            <a:endParaRPr lang="en-US" dirty="0"/>
+          </a:p>
+          <a:p>
+            <a:r>
+              <a:rPr lang="en-US" dirty="0"/>
+              <a:t>Casual Riders ride during the weekend, later in the day during the warmer summer months and they are riding in areas where it’s fun to ride, like parks or other green spaces.</a:t>
+            </a:r>
+          </a:p>
+          <a:p>
+            <a:endParaRPr lang="en-US" dirty="0"/>
+          </a:p>
+          <a:p>
+            <a:endParaRPr lang="en-US" dirty="0"/>
+          </a:p>
+          <a:p>
+            <a:endParaRPr lang="en-CA" dirty="0"/>
           </a:p>
         </p:txBody>
       </p:sp>
@@ -13380,7 +13311,7 @@
           <a:p>
             <a:fld id="{28CF0B81-02AC-4A04-B1DC-20AE0A764FEF}" type="slidenum">
               <a:rPr lang="en-CA" smtClean="0"/>
-              <a:t>19</a:t>
+              <a:t>18</a:t>
             </a:fld>
             <a:endParaRPr lang="en-CA"/>
           </a:p>
@@ -13389,7 +13320,7 @@
     </p:spTree>
     <p:extLst>
       <p:ext uri="{BB962C8B-B14F-4D97-AF65-F5344CB8AC3E}">
-        <p14:creationId xmlns:p14="http://schemas.microsoft.com/office/powerpoint/2010/main" val="1565707342"/>
+        <p14:creationId xmlns:p14="http://schemas.microsoft.com/office/powerpoint/2010/main" val="4199497915"/>
       </p:ext>
     </p:extLst>
   </p:cSld>
@@ -13445,36 +13376,41 @@
           <a:p>
             <a:r>
               <a:rPr lang="en-US" dirty="0"/>
-              <a:t>One limitation with this analysis is that we were limited to examining rides and not users. There was no way to know for sure if we have thousands of individual users using the service or just a handful of ‘power users’. By having additional access to who is using the service we can make our analysis more accurate.</a:t>
+              <a:t>From the trends in annual members and casual riders, we would suggest that the marketing department take the following actions:</a:t>
             </a:r>
           </a:p>
           <a:p>
             <a:endParaRPr lang="en-US" dirty="0"/>
           </a:p>
           <a:p>
+            <a:pPr marL="228600" indent="-228600">
+              <a:buFont typeface="+mj-lt"/>
+              <a:buAutoNum type="arabicPeriod"/>
+            </a:pPr>
             <a:r>
               <a:rPr lang="en-US" dirty="0"/>
-              <a:t>For example, we have no way to know from the ride data if a casual rider is a tourist using the service while they are visiting or if they are a resident of Chicago who uses the service regularly. A tourist is unlikely to ever get an annual membership, but a resident could be encouraged to switch.</a:t>
+              <a:t>Target users who ride for recreation. Those who go out to parks or are looking for a fun way to get around town during the weekends.</a:t>
             </a:r>
           </a:p>
           <a:p>
-            <a:endParaRPr lang="en-US" dirty="0"/>
-          </a:p>
-          <a:p>
+            <a:pPr marL="228600" indent="-228600">
+              <a:buFont typeface="+mj-lt"/>
+              <a:buAutoNum type="arabicPeriod"/>
+            </a:pPr>
             <a:r>
               <a:rPr lang="en-US" dirty="0"/>
-              <a:t>By having more data on individual users, we can also profile them better. Do they ride as part of a commute or just for recreation or both? Do they ride multiple times a day, a few times a week or only a few times a month?</a:t>
+              <a:t>Focus ads to run during the summer when casual riders are more likely to use the service as opposed to winter.</a:t>
             </a:r>
           </a:p>
           <a:p>
-            <a:endParaRPr lang="en-US" dirty="0"/>
-          </a:p>
-          <a:p>
+            <a:pPr marL="228600" indent="-228600">
+              <a:buFont typeface="+mj-lt"/>
+              <a:buAutoNum type="arabicPeriod"/>
+            </a:pPr>
             <a:r>
               <a:rPr lang="en-US" dirty="0"/>
-              <a:t>By getting access to more user information, not only can we better identify what separates annual members from casual riders, but we can look to see how to best fit the needs of all our customers.</a:t>
+              <a:t>Incorporate electric bikes in the advertising. Either by showing off the electric bikes or possibly offer a promotion or some incentive to make accessing an electric bike easier with an annual membership to encourage more casual riders to switch.</a:t>
             </a:r>
-            <a:endParaRPr lang="en-CA" dirty="0"/>
           </a:p>
         </p:txBody>
       </p:sp>
@@ -13495,7 +13431,7 @@
           <a:p>
             <a:fld id="{28CF0B81-02AC-4A04-B1DC-20AE0A764FEF}" type="slidenum">
               <a:rPr lang="en-CA" smtClean="0"/>
-              <a:t>20</a:t>
+              <a:t>19</a:t>
             </a:fld>
             <a:endParaRPr lang="en-CA"/>
           </a:p>
@@ -13504,7 +13440,7 @@
     </p:spTree>
     <p:extLst>
       <p:ext uri="{BB962C8B-B14F-4D97-AF65-F5344CB8AC3E}">
-        <p14:creationId xmlns:p14="http://schemas.microsoft.com/office/powerpoint/2010/main" val="803664814"/>
+        <p14:creationId xmlns:p14="http://schemas.microsoft.com/office/powerpoint/2010/main" val="1565707342"/>
       </p:ext>
     </p:extLst>
   </p:cSld>
@@ -13564,17 +13500,24 @@
             </a:r>
             <a:r>
               <a:rPr lang="en-US" dirty="0"/>
-              <a:t> intends to create a marketing campaign designed to convert casual riders into annual members. </a:t>
+              <a:t> is a bike-share service operating a fleet of 5842 bicycles across 692 stations in Chicago.</a:t>
             </a:r>
           </a:p>
           <a:p>
             <a:endParaRPr lang="en-US" dirty="0"/>
           </a:p>
           <a:p>
+            <a:r>
+              <a:rPr lang="en-US" dirty="0" err="1"/>
+              <a:t>Cyclistic</a:t>
+            </a:r>
             <a:r>
               <a:rPr lang="en-US" dirty="0"/>
-              <a:t>To be able to do this effectively, the following actions will be performed:</a:t>
+              <a:t> categorized their riders in one of two categories:</a:t>
             </a:r>
+          </a:p>
+          <a:p>
+            <a:endParaRPr lang="en-US" dirty="0"/>
           </a:p>
           <a:p>
             <a:pPr marL="171450" indent="-171450">
@@ -13583,7 +13526,7 @@
             </a:pPr>
             <a:r>
               <a:rPr lang="en-US" dirty="0"/>
-              <a:t>Historical bike trip data will be analyzed.</a:t>
+              <a:t>Casual riders who use single-ride passes or full-day passes</a:t>
             </a:r>
           </a:p>
           <a:p>
@@ -13593,35 +13536,37 @@
             </a:pPr>
             <a:r>
               <a:rPr lang="en-US" dirty="0"/>
-              <a:t>Difference between casual riders and annual members need to be found.</a:t>
+              <a:t>Riders with annual memberships.</a:t>
             </a:r>
           </a:p>
           <a:p>
-            <a:pPr marL="171450" indent="-171450">
-              <a:buFont typeface="Arial" panose="020B0604020202020204" pitchFamily="34" charset="0"/>
-              <a:buChar char="•"/>
-            </a:pPr>
+            <a:endParaRPr lang="en-US" dirty="0"/>
+          </a:p>
+          <a:p>
+            <a:r>
+              <a:rPr lang="en-US" dirty="0" err="1"/>
+              <a:t>Cyclistic's</a:t>
+            </a:r>
             <a:r>
               <a:rPr lang="en-US" dirty="0"/>
-              <a:t>Trends in how casual riders and annual members use </a:t>
+              <a:t> financial analysts have concluded that annual members are more profitable than casual riders. As a result, the marketing team wants to create a marketing campaign designed to convert casual riders into annual members.</a:t>
+            </a:r>
+          </a:p>
+          <a:p>
+            <a:endParaRPr lang="en-US" dirty="0"/>
+          </a:p>
+          <a:p>
+            <a:r>
+              <a:rPr lang="en-US" dirty="0"/>
+              <a:t>However, before the marketing campaign can be started, trends need to be identified in </a:t>
             </a:r>
             <a:r>
               <a:rPr lang="en-US" dirty="0" err="1"/>
-              <a:t>Cyclistic</a:t>
+              <a:t>Cyclistic's</a:t>
             </a:r>
             <a:r>
               <a:rPr lang="en-US" dirty="0"/>
-              <a:t> will be identified.</a:t>
-            </a:r>
-          </a:p>
-          <a:p>
-            <a:pPr marL="171450" indent="-171450">
-              <a:buFont typeface="Arial" panose="020B0604020202020204" pitchFamily="34" charset="0"/>
-              <a:buChar char="•"/>
-            </a:pPr>
-            <a:r>
-              <a:rPr lang="en-US" dirty="0"/>
-              <a:t>Suggestions to the marketing team on how to use this information will be given.</a:t>
+              <a:t> historical bike trip data.</a:t>
             </a:r>
             <a:endParaRPr lang="en-CA" dirty="0"/>
           </a:p>
@@ -13644,7 +13589,7 @@
           <a:p>
             <a:fld id="{28CF0B81-02AC-4A04-B1DC-20AE0A764FEF}" type="slidenum">
               <a:rPr lang="en-CA" smtClean="0"/>
-              <a:t>3</a:t>
+              <a:t>2</a:t>
             </a:fld>
             <a:endParaRPr lang="en-CA"/>
           </a:p>
@@ -13653,7 +13598,122 @@
     </p:spTree>
     <p:extLst>
       <p:ext uri="{BB962C8B-B14F-4D97-AF65-F5344CB8AC3E}">
-        <p14:creationId xmlns:p14="http://schemas.microsoft.com/office/powerpoint/2010/main" val="4038894470"/>
+        <p14:creationId xmlns:p14="http://schemas.microsoft.com/office/powerpoint/2010/main" val="2629872750"/>
+      </p:ext>
+    </p:extLst>
+  </p:cSld>
+  <p:clrMapOvr>
+    <a:masterClrMapping/>
+  </p:clrMapOvr>
+</p:notes>
+</file>
+
+<file path=ppt/notesSlides/notesSlide20.xml><?xml version="1.0" encoding="utf-8"?>
+<p:notes xmlns:a="http://schemas.openxmlformats.org/drawingml/2006/main" xmlns:r="http://schemas.openxmlformats.org/officeDocument/2006/relationships" xmlns:p="http://schemas.openxmlformats.org/presentationml/2006/main">
+  <p:cSld>
+    <p:spTree>
+      <p:nvGrpSpPr>
+        <p:cNvPr id="1" name=""/>
+        <p:cNvGrpSpPr/>
+        <p:nvPr/>
+      </p:nvGrpSpPr>
+      <p:grpSpPr>
+        <a:xfrm>
+          <a:off x="0" y="0"/>
+          <a:ext cx="0" cy="0"/>
+          <a:chOff x="0" y="0"/>
+          <a:chExt cx="0" cy="0"/>
+        </a:xfrm>
+      </p:grpSpPr>
+      <p:sp>
+        <p:nvSpPr>
+          <p:cNvPr id="2" name="Slide Image Placeholder 1"/>
+          <p:cNvSpPr>
+            <a:spLocks noGrp="1" noRot="1" noChangeAspect="1"/>
+          </p:cNvSpPr>
+          <p:nvPr>
+            <p:ph type="sldImg"/>
+          </p:nvPr>
+        </p:nvSpPr>
+        <p:spPr/>
+      </p:sp>
+      <p:sp>
+        <p:nvSpPr>
+          <p:cNvPr id="3" name="Notes Placeholder 2"/>
+          <p:cNvSpPr>
+            <a:spLocks noGrp="1"/>
+          </p:cNvSpPr>
+          <p:nvPr>
+            <p:ph type="body" idx="1"/>
+          </p:nvPr>
+        </p:nvSpPr>
+        <p:spPr/>
+        <p:txBody>
+          <a:bodyPr/>
+          <a:lstStyle/>
+          <a:p>
+            <a:r>
+              <a:rPr lang="en-US" dirty="0"/>
+              <a:t>One limitation with this analysis is that we were limited to examining rides and not users. There was no way to know for sure if we have thousands of individual users using the service or just a handful of ‘power users’. By having additional access to who is using the service we can make our analysis more accurate.</a:t>
+            </a:r>
+          </a:p>
+          <a:p>
+            <a:endParaRPr lang="en-US" dirty="0"/>
+          </a:p>
+          <a:p>
+            <a:r>
+              <a:rPr lang="en-US" dirty="0"/>
+              <a:t>For example, we have no way to know from the ride data if a casual rider is a tourist using the service while they are visiting or if they are a resident of Chicago who uses the service regularly. A tourist is unlikely to ever get an annual membership, but a resident could be encouraged to switch.</a:t>
+            </a:r>
+          </a:p>
+          <a:p>
+            <a:endParaRPr lang="en-US" dirty="0"/>
+          </a:p>
+          <a:p>
+            <a:r>
+              <a:rPr lang="en-US" dirty="0"/>
+              <a:t>By having more data on individual users, we can also profile them better. Do they ride as part of a commute or just for recreation or both? Do they ride multiple times a day, a few times a week or only a few times a month?</a:t>
+            </a:r>
+          </a:p>
+          <a:p>
+            <a:endParaRPr lang="en-US" dirty="0"/>
+          </a:p>
+          <a:p>
+            <a:r>
+              <a:rPr lang="en-US" dirty="0"/>
+              <a:t>By getting access to more user information, not only can we better identify what separates annual members from casual riders, but we can look to see how to best fit the needs of all our customers.</a:t>
+            </a:r>
+            <a:endParaRPr lang="en-CA" dirty="0"/>
+          </a:p>
+        </p:txBody>
+      </p:sp>
+      <p:sp>
+        <p:nvSpPr>
+          <p:cNvPr id="4" name="Slide Number Placeholder 3"/>
+          <p:cNvSpPr>
+            <a:spLocks noGrp="1"/>
+          </p:cNvSpPr>
+          <p:nvPr>
+            <p:ph type="sldNum" sz="quarter" idx="5"/>
+          </p:nvPr>
+        </p:nvSpPr>
+        <p:spPr/>
+        <p:txBody>
+          <a:bodyPr/>
+          <a:lstStyle/>
+          <a:p>
+            <a:fld id="{28CF0B81-02AC-4A04-B1DC-20AE0A764FEF}" type="slidenum">
+              <a:rPr lang="en-CA" smtClean="0"/>
+              <a:t>20</a:t>
+            </a:fld>
+            <a:endParaRPr lang="en-CA"/>
+          </a:p>
+        </p:txBody>
+      </p:sp>
+    </p:spTree>
+    <p:extLst>
+      <p:ext uri="{BB962C8B-B14F-4D97-AF65-F5344CB8AC3E}">
+        <p14:creationId xmlns:p14="http://schemas.microsoft.com/office/powerpoint/2010/main" val="803664814"/>
       </p:ext>
     </p:extLst>
   </p:cSld>
@@ -13713,7 +13773,7 @@
             </a:r>
             <a:r>
               <a:rPr lang="en-US" dirty="0"/>
-              <a:t> is not a real company, however the data for this exercise is real and comes from company called Divvy, which is a real bike ride-share company that operates in Chicago.</a:t>
+              <a:t> intends to create a marketing campaign designed to convert casual riders into annual members. </a:t>
             </a:r>
           </a:p>
           <a:p>
@@ -13722,16 +13782,61 @@
           <a:p>
             <a:r>
               <a:rPr lang="en-US" dirty="0"/>
-              <a:t>The past twelve months of data (2022-04 to 2023-03) has been acquired from Divvy's severs.</a:t>
+              <a:t>To be able to do this effectively, the following actions will be performed:</a:t>
             </a:r>
           </a:p>
           <a:p>
-            <a:endParaRPr lang="en-US" dirty="0"/>
-          </a:p>
-          <a:p>
+            <a:pPr marL="171450" indent="-171450">
+              <a:buFont typeface="Arial" panose="020B0604020202020204" pitchFamily="34" charset="0"/>
+              <a:buChar char="•"/>
+            </a:pPr>
             <a:r>
               <a:rPr lang="en-US" dirty="0"/>
-              <a:t>This data is made freely available.</a:t>
+              <a:t>Historical bike trip data will be analyzed.</a:t>
+            </a:r>
+          </a:p>
+          <a:p>
+            <a:pPr marL="171450" indent="-171450">
+              <a:buFont typeface="Arial" panose="020B0604020202020204" pitchFamily="34" charset="0"/>
+              <a:buChar char="•"/>
+            </a:pPr>
+            <a:r>
+              <a:rPr lang="en-US" dirty="0"/>
+              <a:t>Difference between casual riders and annual members need to be found.</a:t>
+            </a:r>
+          </a:p>
+          <a:p>
+            <a:pPr marL="171450" indent="-171450">
+              <a:buFont typeface="Arial" panose="020B0604020202020204" pitchFamily="34" charset="0"/>
+              <a:buChar char="•"/>
+            </a:pPr>
+            <a:r>
+              <a:rPr lang="en-US" dirty="0"/>
+              <a:t>Trends in how casual riders and annual members use </a:t>
+            </a:r>
+            <a:r>
+              <a:rPr lang="en-US" dirty="0" err="1"/>
+              <a:t>Cyclistic</a:t>
+            </a:r>
+            <a:r>
+              <a:rPr lang="en-US" dirty="0"/>
+              <a:t> will be identified.</a:t>
+            </a:r>
+          </a:p>
+          <a:p>
+            <a:pPr marL="171450" indent="-171450">
+              <a:buFont typeface="Arial" panose="020B0604020202020204" pitchFamily="34" charset="0"/>
+              <a:buChar char="•"/>
+            </a:pPr>
+            <a:r>
+              <a:rPr lang="en-US" b="0" dirty="0">
+                <a:solidFill>
+                  <a:srgbClr val="F8F8F2"/>
+                </a:solidFill>
+                <a:effectLst/>
+                <a:latin typeface="Consolas" panose="020B0609020204030204" pitchFamily="49" charset="0"/>
+              </a:rPr>
+              <a:t>Suggestions will be provided to the marketing team on how to use this information.</a:t>
             </a:r>
           </a:p>
         </p:txBody>
@@ -13753,7 +13858,7 @@
           <a:p>
             <a:fld id="{28CF0B81-02AC-4A04-B1DC-20AE0A764FEF}" type="slidenum">
               <a:rPr lang="en-CA" smtClean="0"/>
-              <a:t>4</a:t>
+              <a:t>3</a:t>
             </a:fld>
             <a:endParaRPr lang="en-CA"/>
           </a:p>
@@ -13762,7 +13867,7 @@
     </p:spTree>
     <p:extLst>
       <p:ext uri="{BB962C8B-B14F-4D97-AF65-F5344CB8AC3E}">
-        <p14:creationId xmlns:p14="http://schemas.microsoft.com/office/powerpoint/2010/main" val="2752535549"/>
+        <p14:creationId xmlns:p14="http://schemas.microsoft.com/office/powerpoint/2010/main" val="4038894470"/>
       </p:ext>
     </p:extLst>
   </p:cSld>
@@ -13817,40 +13922,68 @@
           <a:lstStyle/>
           <a:p>
             <a:r>
-              <a:rPr lang="en-US" dirty="0"/>
-              <a:t>The bulk of the data processing involved determining when a ride took place and where a ride took place.</a:t>
+              <a:rPr lang="en-US" dirty="0" err="1"/>
+              <a:t>Cyclistic</a:t>
             </a:r>
-          </a:p>
-          <a:p>
-            <a:endParaRPr lang="en-US" dirty="0"/>
-          </a:p>
-          <a:p>
             <a:r>
               <a:rPr lang="en-US" dirty="0"/>
-              <a:t>The question of when a ride took place was solved by taking the start time of a ride and using that to determine the month, day of the week and the time of day (morning, afternoon, evening or night) that a ride took place.</a:t>
+              <a:t> is not a real company, however the data for this exercise is real and comes from company called Divvy, which is a real bike ride-share company that operates in Chicago.</a:t>
+            </a:r>
+          </a:p>
+          <a:p>
+            <a:endParaRPr lang="en-US" dirty="0"/>
+          </a:p>
+          <a:p>
+            <a:r>
+              <a:rPr lang="en-US" dirty="0"/>
+              <a:t>This analysis will be performed using the past twelve months of data (2022-04 to 2023-03) from Divvy's severs.</a:t>
+            </a:r>
+          </a:p>
+          <a:p>
+            <a:endParaRPr lang="en-US" dirty="0"/>
+          </a:p>
+          <a:p>
+            <a:r>
+              <a:rPr lang="en-US" dirty="0"/>
+              <a:t>Divvy offers this data freely. There is a license associated with it, which allows for it to be used in academic purposes such as this.</a:t>
+            </a:r>
+          </a:p>
+          <a:p>
+            <a:endParaRPr lang="en-US" dirty="0"/>
+          </a:p>
+          <a:p>
+            <a:pPr marL="0" marR="0" lvl="0" indent="0" algn="l" defTabSz="914400" rtl="0" eaLnBrk="1" fontAlgn="auto" latinLnBrk="0" hangingPunct="1">
+              <a:lnSpc>
+                <a:spcPct val="100000"/>
+              </a:lnSpc>
+              <a:spcBef>
+                <a:spcPts val="0"/>
+              </a:spcBef>
+              <a:spcAft>
+                <a:spcPts val="0"/>
+              </a:spcAft>
+              <a:buClrTx/>
+              <a:buSzTx/>
+              <a:buFontTx/>
+              <a:buNone/>
+              <a:tabLst/>
+              <a:defRPr/>
+            </a:pPr>
+            <a:r>
+              <a:rPr lang="en-US" sz="1200" dirty="0"/>
+              <a:t>This data contains no private information (names, credit card numbers, </a:t>
             </a:r>
             <a:r>
-              <a:rPr lang="en-CA" dirty="0"/>
-              <a:t> </a:t>
+              <a:rPr lang="en-US" sz="1200" dirty="0" err="1"/>
+              <a:t>etc</a:t>
             </a:r>
-          </a:p>
-          <a:p>
-            <a:endParaRPr lang="en-CA" dirty="0"/>
-          </a:p>
-          <a:p>
             <a:r>
-              <a:rPr lang="en-CA" dirty="0"/>
-              <a:t>Ride duration was calculated by finding the difference between when a ride ended and when a ride started.</a:t>
+              <a:rPr lang="en-US" sz="1200" dirty="0"/>
+              <a:t>).</a:t>
             </a:r>
-          </a:p>
-          <a:p>
-            <a:endParaRPr lang="en-CA" dirty="0"/>
-          </a:p>
-          <a:p>
-            <a:r>
-              <a:rPr lang="en-CA" dirty="0"/>
-              <a:t>Identifying where a ride took place was done by taking the starting latitude and longitude of a ride and cross referencing it with geospatial data of the different neighborhoods of Chicago. By doing this we could determine in what area of Chicago a ride took place.</a:t>
-            </a:r>
+            <a:endParaRPr lang="en-CA" sz="1200" dirty="0"/>
+          </a:p>
+          <a:p>
             <a:endParaRPr lang="en-US" dirty="0"/>
           </a:p>
         </p:txBody>
@@ -13872,7 +14005,7 @@
           <a:p>
             <a:fld id="{28CF0B81-02AC-4A04-B1DC-20AE0A764FEF}" type="slidenum">
               <a:rPr lang="en-CA" smtClean="0"/>
-              <a:t>5</a:t>
+              <a:t>4</a:t>
             </a:fld>
             <a:endParaRPr lang="en-CA"/>
           </a:p>
@@ -13881,7 +14014,7 @@
     </p:spTree>
     <p:extLst>
       <p:ext uri="{BB962C8B-B14F-4D97-AF65-F5344CB8AC3E}">
-        <p14:creationId xmlns:p14="http://schemas.microsoft.com/office/powerpoint/2010/main" val="4251944900"/>
+        <p14:creationId xmlns:p14="http://schemas.microsoft.com/office/powerpoint/2010/main" val="2752535549"/>
       </p:ext>
     </p:extLst>
   </p:cSld>
@@ -13937,17 +14070,40 @@
           <a:p>
             <a:r>
               <a:rPr lang="en-US" dirty="0"/>
-              <a:t>The first analysis that was performed was identifying the casual riders from the annual members.</a:t>
+              <a:t>The bulk of the data processing involved determining when a ride took place and where a ride took place.</a:t>
             </a:r>
           </a:p>
           <a:p>
-            <a:endParaRPr lang="en-CA" dirty="0"/>
-          </a:p>
-          <a:p>
+            <a:endParaRPr lang="en-US" dirty="0"/>
+          </a:p>
+          <a:p>
+            <a:r>
+              <a:rPr lang="en-US" dirty="0"/>
+              <a:t>The question of when a ride took place was solved by taking the start time of a ride and using that to determine the month, day of the week and the time of day (morning, afternoon, evening or night) that a ride took place.</a:t>
+            </a:r>
             <a:r>
               <a:rPr lang="en-CA" dirty="0"/>
-              <a:t>What we see is that most rides (60%) are performed by annual members.</a:t>
+              <a:t> </a:t>
             </a:r>
+          </a:p>
+          <a:p>
+            <a:endParaRPr lang="en-CA" dirty="0"/>
+          </a:p>
+          <a:p>
+            <a:r>
+              <a:rPr lang="en-CA" dirty="0"/>
+              <a:t>Ride duration was calculated by finding the difference between when a ride ended and when a ride started.</a:t>
+            </a:r>
+          </a:p>
+          <a:p>
+            <a:endParaRPr lang="en-CA" dirty="0"/>
+          </a:p>
+          <a:p>
+            <a:r>
+              <a:rPr lang="en-CA" dirty="0"/>
+              <a:t>Identifying where a ride took place was done by taking the starting latitude and longitude of a ride and cross referencing it with geospatial data of the different neighborhoods of Chicago. By doing this we could determine in what area of Chicago a ride took place.</a:t>
+            </a:r>
+            <a:endParaRPr lang="en-US" dirty="0"/>
           </a:p>
         </p:txBody>
       </p:sp>
@@ -13968,7 +14124,7 @@
           <a:p>
             <a:fld id="{28CF0B81-02AC-4A04-B1DC-20AE0A764FEF}" type="slidenum">
               <a:rPr lang="en-CA" smtClean="0"/>
-              <a:t>6</a:t>
+              <a:t>5</a:t>
             </a:fld>
             <a:endParaRPr lang="en-CA"/>
           </a:p>
@@ -13977,7 +14133,7 @@
     </p:spTree>
     <p:extLst>
       <p:ext uri="{BB962C8B-B14F-4D97-AF65-F5344CB8AC3E}">
-        <p14:creationId xmlns:p14="http://schemas.microsoft.com/office/powerpoint/2010/main" val="1735996512"/>
+        <p14:creationId xmlns:p14="http://schemas.microsoft.com/office/powerpoint/2010/main" val="4251944900"/>
       </p:ext>
     </p:extLst>
   </p:cSld>
@@ -14033,41 +14189,17 @@
           <a:p>
             <a:r>
               <a:rPr lang="en-US" dirty="0"/>
-              <a:t>The following graph shows the number of rides over the different months.</a:t>
+              <a:t>The first analysis that was performed was identifying the casual riders from the annual members.</a:t>
             </a:r>
           </a:p>
           <a:p>
-            <a:endParaRPr lang="en-US" dirty="0"/>
+            <a:endParaRPr lang="en-CA" dirty="0"/>
           </a:p>
           <a:p>
             <a:r>
-              <a:rPr lang="en-US" dirty="0"/>
-              <a:t>What we can see is that the warm summer months have the most rides while the cold winter months have the fewest.</a:t>
+              <a:rPr lang="en-CA" dirty="0"/>
+              <a:t>What we see is that most rides (60%) are performed by annual members.</a:t>
             </a:r>
-          </a:p>
-          <a:p>
-            <a:endParaRPr lang="en-US" dirty="0"/>
-          </a:p>
-          <a:p>
-            <a:r>
-              <a:rPr lang="en-US" dirty="0"/>
-              <a:t>And while the winter does have fewer number of rides, annual members do ride in significant numbers during those months.</a:t>
-            </a:r>
-          </a:p>
-          <a:p>
-            <a:endParaRPr lang="en-US" dirty="0"/>
-          </a:p>
-          <a:p>
-            <a:r>
-              <a:rPr lang="en-US" dirty="0"/>
-              <a:t>In comparison, casual riders ride very little in the winter but ride in large amounts during the summer; there are almost as many casual riders during the summer as there are annual members.</a:t>
-            </a:r>
-          </a:p>
-          <a:p>
-            <a:endParaRPr lang="en-US" dirty="0"/>
-          </a:p>
-          <a:p>
-            <a:endParaRPr lang="en-CA" dirty="0"/>
           </a:p>
         </p:txBody>
       </p:sp>
@@ -14088,7 +14220,7 @@
           <a:p>
             <a:fld id="{28CF0B81-02AC-4A04-B1DC-20AE0A764FEF}" type="slidenum">
               <a:rPr lang="en-CA" smtClean="0"/>
-              <a:t>7</a:t>
+              <a:t>6</a:t>
             </a:fld>
             <a:endParaRPr lang="en-CA"/>
           </a:p>
@@ -14097,7 +14229,7 @@
     </p:spTree>
     <p:extLst>
       <p:ext uri="{BB962C8B-B14F-4D97-AF65-F5344CB8AC3E}">
-        <p14:creationId xmlns:p14="http://schemas.microsoft.com/office/powerpoint/2010/main" val="4239688449"/>
+        <p14:creationId xmlns:p14="http://schemas.microsoft.com/office/powerpoint/2010/main" val="1735996512"/>
       </p:ext>
     </p:extLst>
   </p:cSld>
@@ -14153,7 +14285,7 @@
           <a:p>
             <a:r>
               <a:rPr lang="en-US" dirty="0"/>
-              <a:t>The following graph shows the number of rides by day of the week.</a:t>
+              <a:t>The following graph shows the number of rides over the different months.</a:t>
             </a:r>
           </a:p>
           <a:p>
@@ -14162,8 +14294,31 @@
           <a:p>
             <a:r>
               <a:rPr lang="en-US" dirty="0"/>
-              <a:t>We see that annual members are more likely to ride during the week (Monday to Friday) while casual riders are more often to ride on the weekend (Saturday and Sunday).</a:t>
+              <a:t>What we can see is that the warm summer months have the most rides while the cold winter months have the fewest.</a:t>
             </a:r>
+          </a:p>
+          <a:p>
+            <a:endParaRPr lang="en-US" dirty="0"/>
+          </a:p>
+          <a:p>
+            <a:r>
+              <a:rPr lang="en-US" dirty="0"/>
+              <a:t>And while the winter does have fewer number of rides, annual members do ride in significant numbers during those months.</a:t>
+            </a:r>
+          </a:p>
+          <a:p>
+            <a:endParaRPr lang="en-US" dirty="0"/>
+          </a:p>
+          <a:p>
+            <a:r>
+              <a:rPr lang="en-US" dirty="0"/>
+              <a:t>In comparison, casual riders ride very little in the winter but ride in large amounts during the summer; there are almost as many casual riders during the summer as there are annual members.</a:t>
+            </a:r>
+          </a:p>
+          <a:p>
+            <a:endParaRPr lang="en-US" dirty="0"/>
+          </a:p>
+          <a:p>
             <a:endParaRPr lang="en-CA" dirty="0"/>
           </a:p>
         </p:txBody>
@@ -14185,7 +14340,7 @@
           <a:p>
             <a:fld id="{28CF0B81-02AC-4A04-B1DC-20AE0A764FEF}" type="slidenum">
               <a:rPr lang="en-CA" smtClean="0"/>
-              <a:t>8</a:t>
+              <a:t>7</a:t>
             </a:fld>
             <a:endParaRPr lang="en-CA"/>
           </a:p>
@@ -14194,7 +14349,7 @@
     </p:spTree>
     <p:extLst>
       <p:ext uri="{BB962C8B-B14F-4D97-AF65-F5344CB8AC3E}">
-        <p14:creationId xmlns:p14="http://schemas.microsoft.com/office/powerpoint/2010/main" val="1735388459"/>
+        <p14:creationId xmlns:p14="http://schemas.microsoft.com/office/powerpoint/2010/main" val="4239688449"/>
       </p:ext>
     </p:extLst>
   </p:cSld>
@@ -14250,7 +14405,7 @@
           <a:p>
             <a:r>
               <a:rPr lang="en-US" dirty="0"/>
-              <a:t>This graphic shows the number the number of rides by time of day.</a:t>
+              <a:t>The following graph shows the number of rides by day of the week.</a:t>
             </a:r>
           </a:p>
           <a:p>
@@ -14259,16 +14414,7 @@
           <a:p>
             <a:r>
               <a:rPr lang="en-US" dirty="0"/>
-              <a:t>Both casual riders and annual members are more often to ride during the afternoon and least often at night.</a:t>
-            </a:r>
-          </a:p>
-          <a:p>
-            <a:endParaRPr lang="en-US" dirty="0"/>
-          </a:p>
-          <a:p>
-            <a:r>
-              <a:rPr lang="en-US" dirty="0"/>
-              <a:t>Casual riders are more likely to ride during the evening than during the morning, while annual members ride morning and evening at relatively equal numbers.</a:t>
+              <a:t>We see that annual members are more likely to ride during the week (Monday to Friday) while casual riders are more often to ride on the weekend (Saturday and Sunday).</a:t>
             </a:r>
             <a:endParaRPr lang="en-CA" dirty="0"/>
           </a:p>
@@ -14291,7 +14437,7 @@
           <a:p>
             <a:fld id="{28CF0B81-02AC-4A04-B1DC-20AE0A764FEF}" type="slidenum">
               <a:rPr lang="en-CA" smtClean="0"/>
-              <a:t>9</a:t>
+              <a:t>8</a:t>
             </a:fld>
             <a:endParaRPr lang="en-CA"/>
           </a:p>
@@ -14300,7 +14446,7 @@
     </p:spTree>
     <p:extLst>
       <p:ext uri="{BB962C8B-B14F-4D97-AF65-F5344CB8AC3E}">
-        <p14:creationId xmlns:p14="http://schemas.microsoft.com/office/powerpoint/2010/main" val="3119157664"/>
+        <p14:creationId xmlns:p14="http://schemas.microsoft.com/office/powerpoint/2010/main" val="1735388459"/>
       </p:ext>
     </p:extLst>
   </p:cSld>
@@ -14356,7 +14502,7 @@
           <a:p>
             <a:r>
               <a:rPr lang="en-US" dirty="0"/>
-              <a:t>Rides from annual members tend to be shorter than casual riders. </a:t>
+              <a:t>This graphic shows the number the number of rides by time of day.</a:t>
             </a:r>
           </a:p>
           <a:p>
@@ -14365,8 +14511,18 @@
           <a:p>
             <a:r>
               <a:rPr lang="en-US" dirty="0"/>
-              <a:t>The ride duration for annual members is heavily grouped around the 5-minute mark, and while casual riders do also tend to like short rides, the concentration is not as extreme.</a:t>
+              <a:t>Both casual riders and annual members are more often to ride during the afternoon and least often at night.</a:t>
             </a:r>
+          </a:p>
+          <a:p>
+            <a:endParaRPr lang="en-US" dirty="0"/>
+          </a:p>
+          <a:p>
+            <a:r>
+              <a:rPr lang="en-US" dirty="0"/>
+              <a:t>Casual riders are more likely to ride during the evening than during the morning, while annual members ride morning and evening at relatively equal numbers.</a:t>
+            </a:r>
+            <a:endParaRPr lang="en-CA" dirty="0"/>
           </a:p>
         </p:txBody>
       </p:sp>
@@ -14387,7 +14543,7 @@
           <a:p>
             <a:fld id="{28CF0B81-02AC-4A04-B1DC-20AE0A764FEF}" type="slidenum">
               <a:rPr lang="en-CA" smtClean="0"/>
-              <a:t>10</a:t>
+              <a:t>9</a:t>
             </a:fld>
             <a:endParaRPr lang="en-CA"/>
           </a:p>
@@ -14396,7 +14552,7 @@
     </p:spTree>
     <p:extLst>
       <p:ext uri="{BB962C8B-B14F-4D97-AF65-F5344CB8AC3E}">
-        <p14:creationId xmlns:p14="http://schemas.microsoft.com/office/powerpoint/2010/main" val="4278072958"/>
+        <p14:creationId xmlns:p14="http://schemas.microsoft.com/office/powerpoint/2010/main" val="3119157664"/>
       </p:ext>
     </p:extLst>
   </p:cSld>
@@ -14555,7 +14711,7 @@
           <a:p>
             <a:fld id="{18CCFA4A-48F4-4778-B67C-8F208EAD8152}" type="datetimeFigureOut">
               <a:rPr lang="en-CA" smtClean="0"/>
-              <a:t>08/08/2023</a:t>
+              <a:t>08/09/2023</a:t>
             </a:fld>
             <a:endParaRPr lang="en-CA"/>
           </a:p>
@@ -14755,7 +14911,7 @@
           <a:p>
             <a:fld id="{18CCFA4A-48F4-4778-B67C-8F208EAD8152}" type="datetimeFigureOut">
               <a:rPr lang="en-CA" smtClean="0"/>
-              <a:t>08/08/2023</a:t>
+              <a:t>08/09/2023</a:t>
             </a:fld>
             <a:endParaRPr lang="en-CA"/>
           </a:p>
@@ -14965,7 +15121,7 @@
           <a:p>
             <a:fld id="{18CCFA4A-48F4-4778-B67C-8F208EAD8152}" type="datetimeFigureOut">
               <a:rPr lang="en-CA" smtClean="0"/>
-              <a:t>08/08/2023</a:t>
+              <a:t>08/09/2023</a:t>
             </a:fld>
             <a:endParaRPr lang="en-CA"/>
           </a:p>
@@ -15165,7 +15321,7 @@
           <a:p>
             <a:fld id="{18CCFA4A-48F4-4778-B67C-8F208EAD8152}" type="datetimeFigureOut">
               <a:rPr lang="en-CA" smtClean="0"/>
-              <a:t>08/08/2023</a:t>
+              <a:t>08/09/2023</a:t>
             </a:fld>
             <a:endParaRPr lang="en-CA"/>
           </a:p>
@@ -15441,7 +15597,7 @@
           <a:p>
             <a:fld id="{18CCFA4A-48F4-4778-B67C-8F208EAD8152}" type="datetimeFigureOut">
               <a:rPr lang="en-CA" smtClean="0"/>
-              <a:t>08/08/2023</a:t>
+              <a:t>08/09/2023</a:t>
             </a:fld>
             <a:endParaRPr lang="en-CA"/>
           </a:p>
@@ -15709,7 +15865,7 @@
           <a:p>
             <a:fld id="{18CCFA4A-48F4-4778-B67C-8F208EAD8152}" type="datetimeFigureOut">
               <a:rPr lang="en-CA" smtClean="0"/>
-              <a:t>08/08/2023</a:t>
+              <a:t>08/09/2023</a:t>
             </a:fld>
             <a:endParaRPr lang="en-CA"/>
           </a:p>
@@ -16124,7 +16280,7 @@
           <a:p>
             <a:fld id="{18CCFA4A-48F4-4778-B67C-8F208EAD8152}" type="datetimeFigureOut">
               <a:rPr lang="en-CA" smtClean="0"/>
-              <a:t>08/08/2023</a:t>
+              <a:t>08/09/2023</a:t>
             </a:fld>
             <a:endParaRPr lang="en-CA"/>
           </a:p>
@@ -16266,7 +16422,7 @@
           <a:p>
             <a:fld id="{18CCFA4A-48F4-4778-B67C-8F208EAD8152}" type="datetimeFigureOut">
               <a:rPr lang="en-CA" smtClean="0"/>
-              <a:t>08/08/2023</a:t>
+              <a:t>08/09/2023</a:t>
             </a:fld>
             <a:endParaRPr lang="en-CA"/>
           </a:p>
@@ -16379,7 +16535,7 @@
           <a:p>
             <a:fld id="{18CCFA4A-48F4-4778-B67C-8F208EAD8152}" type="datetimeFigureOut">
               <a:rPr lang="en-CA" smtClean="0"/>
-              <a:t>08/08/2023</a:t>
+              <a:t>08/09/2023</a:t>
             </a:fld>
             <a:endParaRPr lang="en-CA"/>
           </a:p>
@@ -16692,7 +16848,7 @@
           <a:p>
             <a:fld id="{18CCFA4A-48F4-4778-B67C-8F208EAD8152}" type="datetimeFigureOut">
               <a:rPr lang="en-CA" smtClean="0"/>
-              <a:t>08/08/2023</a:t>
+              <a:t>08/09/2023</a:t>
             </a:fld>
             <a:endParaRPr lang="en-CA"/>
           </a:p>
@@ -16981,7 +17137,7 @@
           <a:p>
             <a:fld id="{18CCFA4A-48F4-4778-B67C-8F208EAD8152}" type="datetimeFigureOut">
               <a:rPr lang="en-CA" smtClean="0"/>
-              <a:t>08/08/2023</a:t>
+              <a:t>08/09/2023</a:t>
             </a:fld>
             <a:endParaRPr lang="en-CA"/>
           </a:p>
@@ -17224,7 +17380,7 @@
           <a:p>
             <a:fld id="{18CCFA4A-48F4-4778-B67C-8F208EAD8152}" type="datetimeFigureOut">
               <a:rPr lang="en-CA" smtClean="0"/>
-              <a:t>08/08/2023</a:t>
+              <a:t>08/09/2023</a:t>
             </a:fld>
             <a:endParaRPr lang="en-CA"/>
           </a:p>
@@ -19519,7 +19675,7 @@
             <p:ph sz="half" idx="2"/>
             <p:extLst>
               <p:ext uri="{D42A27DB-BD31-4B8C-83A1-F6EECF244321}">
-                <p14:modId xmlns:p14="http://schemas.microsoft.com/office/powerpoint/2010/main" val="1261350694"/>
+                <p14:modId xmlns:p14="http://schemas.microsoft.com/office/powerpoint/2010/main" val="3272034647"/>
               </p:ext>
             </p:extLst>
           </p:nvPr>
@@ -19583,7 +19739,7 @@
                           </a:solidFill>
                           <a:effectLst/>
                         </a:rPr>
-                        <a:t>Total Number of Riders</a:t>
+                        <a:t>Total Number of Rides</a:t>
                       </a:r>
                     </a:p>
                   </a:txBody>
@@ -25451,20 +25607,36 @@
             <a:pPr lvl="1"/>
             <a:r>
               <a:rPr lang="en-US" sz="1800" dirty="0"/>
-              <a:t>Annual members</a:t>
+              <a:t>Annual Members</a:t>
             </a:r>
             <a:endParaRPr lang="en-CA" sz="1800" dirty="0"/>
           </a:p>
           <a:p>
             <a:r>
               <a:rPr lang="en-CA" sz="1800" dirty="0"/>
-              <a:t>Annual members are more profitable than casual riders.</a:t>
+              <a:t>Annual Members are more profitable than Casual Riders.</a:t>
             </a:r>
           </a:p>
           <a:p>
             <a:r>
               <a:rPr lang="en-US" sz="1800" dirty="0"/>
-              <a:t>Marketing campaign is to be created to convert casual riders into annual members.</a:t>
+              <a:t>Marketing campaign is to be created to </a:t>
+            </a:r>
+            <a:r>
+              <a:rPr lang="en-US" sz="1800"/>
+              <a:t>convert Casual </a:t>
+            </a:r>
+            <a:r>
+              <a:rPr lang="en-US" sz="1800" dirty="0"/>
+              <a:t>R</a:t>
+            </a:r>
+            <a:r>
+              <a:rPr lang="en-US" sz="1800"/>
+              <a:t>iders </a:t>
+            </a:r>
+            <a:r>
+              <a:rPr lang="en-US" sz="1800" dirty="0"/>
+              <a:t>into annual members.</a:t>
             </a:r>
           </a:p>
         </p:txBody>
@@ -27007,21 +27179,6 @@
               <a:t>Analysis performed on 12 months of data.</a:t>
             </a:r>
           </a:p>
-          <a:p>
-            <a:r>
-              <a:rPr lang="en-US" sz="2400" dirty="0"/>
-              <a:t>Data contains no private information (names, credit card numbers, </a:t>
-            </a:r>
-            <a:r>
-              <a:rPr lang="en-US" sz="2400" dirty="0" err="1"/>
-              <a:t>etc</a:t>
-            </a:r>
-            <a:r>
-              <a:rPr lang="en-US" sz="2400" dirty="0"/>
-              <a:t>).</a:t>
-            </a:r>
-            <a:endParaRPr lang="en-CA" sz="2400" dirty="0"/>
-          </a:p>
         </p:txBody>
       </p:sp>
     </p:spTree>
@@ -27688,7 +27845,7 @@
       </p:sp>
       <p:pic>
         <p:nvPicPr>
-          <p:cNvPr id="15" name="Content Placeholder 14" descr="A chart of a group of members&#10;&#10;Description automatically generated">
+          <p:cNvPr id="15" name="Content Placeholder 14">
             <a:extLst>
               <a:ext uri="{FF2B5EF4-FFF2-40B4-BE49-F238E27FC236}">
                 <a16:creationId xmlns:a16="http://schemas.microsoft.com/office/drawing/2014/main" id="{F006072F-DEBF-536B-315D-00AA2C4EC1E9}"/>
@@ -27710,9 +27867,8 @@
               </a:ext>
             </a:extLst>
           </a:blip>
-          <a:stretch>
-            <a:fillRect/>
-          </a:stretch>
+          <a:srcRect/>
+          <a:stretch/>
         </p:blipFill>
         <p:spPr>
           <a:xfrm>
@@ -27786,7 +27942,7 @@
       </p:sp>
       <p:pic>
         <p:nvPicPr>
-          <p:cNvPr id="18" name="Content Placeholder 17" descr="A blue and orange pie chart&#10;&#10;Description automatically generated">
+          <p:cNvPr id="18" name="Content Placeholder 17">
             <a:extLst>
               <a:ext uri="{FF2B5EF4-FFF2-40B4-BE49-F238E27FC236}">
                 <a16:creationId xmlns:a16="http://schemas.microsoft.com/office/drawing/2014/main" id="{C845724C-13D9-E37E-5355-0228ABB879AC}"/>
@@ -27808,14 +27964,13 @@
               </a:ext>
             </a:extLst>
           </a:blip>
-          <a:stretch>
-            <a:fillRect/>
-          </a:stretch>
+          <a:srcRect/>
+          <a:stretch/>
         </p:blipFill>
         <p:spPr>
           <a:xfrm>
-            <a:off x="6872192" y="2505075"/>
-            <a:ext cx="3783203" cy="3684588"/>
+            <a:off x="6494558" y="2505075"/>
+            <a:ext cx="4160838" cy="3684588"/>
           </a:xfrm>
         </p:spPr>
       </p:pic>
@@ -28290,7 +28445,7 @@
       </p:sp>
       <p:pic>
         <p:nvPicPr>
-          <p:cNvPr id="10" name="Content Placeholder 9" descr="A graph of a number of riders each month&#10;&#10;Description automatically generated">
+          <p:cNvPr id="10" name="Content Placeholder 9">
             <a:extLst>
               <a:ext uri="{FF2B5EF4-FFF2-40B4-BE49-F238E27FC236}">
                 <a16:creationId xmlns:a16="http://schemas.microsoft.com/office/drawing/2014/main" id="{2E7A9867-859E-5762-E574-20295AE2796C}"/>
@@ -28312,9 +28467,8 @@
               </a:ext>
             </a:extLst>
           </a:blip>
-          <a:stretch>
-            <a:fillRect/>
-          </a:stretch>
+          <a:srcRect/>
+          <a:stretch/>
         </p:blipFill>
         <p:spPr>
           <a:xfrm>
@@ -28766,7 +28920,7 @@
       </p:sp>
       <p:pic>
         <p:nvPicPr>
-          <p:cNvPr id="10" name="Content Placeholder 9" descr="A graph of a number of riders every day of the week&#10;&#10;Description automatically generated">
+          <p:cNvPr id="10" name="Content Placeholder 9">
             <a:extLst>
               <a:ext uri="{FF2B5EF4-FFF2-40B4-BE49-F238E27FC236}">
                 <a16:creationId xmlns:a16="http://schemas.microsoft.com/office/drawing/2014/main" id="{7B05864C-B581-FDA8-2839-B81ABE5F0E9C}"/>
@@ -28788,9 +28942,8 @@
               </a:ext>
             </a:extLst>
           </a:blip>
-          <a:stretch>
-            <a:fillRect/>
-          </a:stretch>
+          <a:srcRect/>
+          <a:stretch/>
         </p:blipFill>
         <p:spPr>
           <a:xfrm>
@@ -29259,7 +29412,7 @@
       </p:sp>
       <p:pic>
         <p:nvPicPr>
-          <p:cNvPr id="6" name="Content Placeholder 5" descr="A graph of different colored bars&#10;&#10;Description automatically generated">
+          <p:cNvPr id="6" name="Content Placeholder 5">
             <a:extLst>
               <a:ext uri="{FF2B5EF4-FFF2-40B4-BE49-F238E27FC236}">
                 <a16:creationId xmlns:a16="http://schemas.microsoft.com/office/drawing/2014/main" id="{C0CDFA61-A691-AA75-B664-2F24D3DD1D92}"/>
@@ -29281,9 +29434,8 @@
               </a:ext>
             </a:extLst>
           </a:blip>
-          <a:stretch>
-            <a:fillRect/>
-          </a:stretch>
+          <a:srcRect/>
+          <a:stretch/>
         </p:blipFill>
         <p:spPr>
           <a:xfrm>

</xml_diff>